<commit_message>
"Getting Started" corrected: - formatting adjusted - "Minimal Example" adapted according to the reference to "jupyter notebook"
</commit_message>
<xml_diff>
--- a/e2niee.github.io/images/getting_started/simple_network.pptx
+++ b/e2niee.github.io/images/getting_started/simple_network.pptx
@@ -104,6 +104,11 @@
       </a:defRPr>
     </a:lvl9pPr>
   </p:defaultTextStyle>
+  <p:extLst>
+    <p:ext uri="{EFAFB233-063F-42B5-8137-9DF3F51BA10A}">
+      <p15:sldGuideLst xmlns:p15="http://schemas.microsoft.com/office/powerpoint/2012/main"/>
+    </p:ext>
+  </p:extLst>
 </p:presentation>
 </file>
 
@@ -238,9 +243,9 @@
           <a:p>
             <a:fld id="{7B2E9E56-18CD-4334-9C94-030B6628076E}" type="datetimeFigureOut">
               <a:rPr lang="de-DE" smtClean="0"/>
-              <a:t>30.10.2019</a:t>
+              <a:t>13.05.2020</a:t>
             </a:fld>
-            <a:endParaRPr lang="de-DE"/>
+            <a:endParaRPr lang="de-DE" dirty="0"/>
           </a:p>
         </p:txBody>
       </p:sp>
@@ -259,7 +264,7 @@
           <a:bodyPr/>
           <a:lstStyle/>
           <a:p>
-            <a:endParaRPr lang="de-DE"/>
+            <a:endParaRPr lang="de-DE" dirty="0"/>
           </a:p>
         </p:txBody>
       </p:sp>
@@ -282,7 +287,7 @@
               <a:rPr lang="de-DE" smtClean="0"/>
               <a:t>‹Nr.›</a:t>
             </a:fld>
-            <a:endParaRPr lang="de-DE"/>
+            <a:endParaRPr lang="de-DE" dirty="0"/>
           </a:p>
         </p:txBody>
       </p:sp>
@@ -408,9 +413,9 @@
           <a:p>
             <a:fld id="{7B2E9E56-18CD-4334-9C94-030B6628076E}" type="datetimeFigureOut">
               <a:rPr lang="de-DE" smtClean="0"/>
-              <a:t>30.10.2019</a:t>
+              <a:t>13.05.2020</a:t>
             </a:fld>
-            <a:endParaRPr lang="de-DE"/>
+            <a:endParaRPr lang="de-DE" dirty="0"/>
           </a:p>
         </p:txBody>
       </p:sp>
@@ -429,7 +434,7 @@
           <a:bodyPr/>
           <a:lstStyle/>
           <a:p>
-            <a:endParaRPr lang="de-DE"/>
+            <a:endParaRPr lang="de-DE" dirty="0"/>
           </a:p>
         </p:txBody>
       </p:sp>
@@ -452,7 +457,7 @@
               <a:rPr lang="de-DE" smtClean="0"/>
               <a:t>‹Nr.›</a:t>
             </a:fld>
-            <a:endParaRPr lang="de-DE"/>
+            <a:endParaRPr lang="de-DE" dirty="0"/>
           </a:p>
         </p:txBody>
       </p:sp>
@@ -588,9 +593,9 @@
           <a:p>
             <a:fld id="{7B2E9E56-18CD-4334-9C94-030B6628076E}" type="datetimeFigureOut">
               <a:rPr lang="de-DE" smtClean="0"/>
-              <a:t>30.10.2019</a:t>
+              <a:t>13.05.2020</a:t>
             </a:fld>
-            <a:endParaRPr lang="de-DE"/>
+            <a:endParaRPr lang="de-DE" dirty="0"/>
           </a:p>
         </p:txBody>
       </p:sp>
@@ -609,7 +614,7 @@
           <a:bodyPr/>
           <a:lstStyle/>
           <a:p>
-            <a:endParaRPr lang="de-DE"/>
+            <a:endParaRPr lang="de-DE" dirty="0"/>
           </a:p>
         </p:txBody>
       </p:sp>
@@ -632,7 +637,7 @@
               <a:rPr lang="de-DE" smtClean="0"/>
               <a:t>‹Nr.›</a:t>
             </a:fld>
-            <a:endParaRPr lang="de-DE"/>
+            <a:endParaRPr lang="de-DE" dirty="0"/>
           </a:p>
         </p:txBody>
       </p:sp>
@@ -758,9 +763,9 @@
           <a:p>
             <a:fld id="{7B2E9E56-18CD-4334-9C94-030B6628076E}" type="datetimeFigureOut">
               <a:rPr lang="de-DE" smtClean="0"/>
-              <a:t>30.10.2019</a:t>
+              <a:t>13.05.2020</a:t>
             </a:fld>
-            <a:endParaRPr lang="de-DE"/>
+            <a:endParaRPr lang="de-DE" dirty="0"/>
           </a:p>
         </p:txBody>
       </p:sp>
@@ -779,7 +784,7 @@
           <a:bodyPr/>
           <a:lstStyle/>
           <a:p>
-            <a:endParaRPr lang="de-DE"/>
+            <a:endParaRPr lang="de-DE" dirty="0"/>
           </a:p>
         </p:txBody>
       </p:sp>
@@ -802,7 +807,7 @@
               <a:rPr lang="de-DE" smtClean="0"/>
               <a:t>‹Nr.›</a:t>
             </a:fld>
-            <a:endParaRPr lang="de-DE"/>
+            <a:endParaRPr lang="de-DE" dirty="0"/>
           </a:p>
         </p:txBody>
       </p:sp>
@@ -1004,9 +1009,9 @@
           <a:p>
             <a:fld id="{7B2E9E56-18CD-4334-9C94-030B6628076E}" type="datetimeFigureOut">
               <a:rPr lang="de-DE" smtClean="0"/>
-              <a:t>30.10.2019</a:t>
+              <a:t>13.05.2020</a:t>
             </a:fld>
-            <a:endParaRPr lang="de-DE"/>
+            <a:endParaRPr lang="de-DE" dirty="0"/>
           </a:p>
         </p:txBody>
       </p:sp>
@@ -1025,7 +1030,7 @@
           <a:bodyPr/>
           <a:lstStyle/>
           <a:p>
-            <a:endParaRPr lang="de-DE"/>
+            <a:endParaRPr lang="de-DE" dirty="0"/>
           </a:p>
         </p:txBody>
       </p:sp>
@@ -1048,7 +1053,7 @@
               <a:rPr lang="de-DE" smtClean="0"/>
               <a:t>‹Nr.›</a:t>
             </a:fld>
-            <a:endParaRPr lang="de-DE"/>
+            <a:endParaRPr lang="de-DE" dirty="0"/>
           </a:p>
         </p:txBody>
       </p:sp>
@@ -1236,9 +1241,9 @@
           <a:p>
             <a:fld id="{7B2E9E56-18CD-4334-9C94-030B6628076E}" type="datetimeFigureOut">
               <a:rPr lang="de-DE" smtClean="0"/>
-              <a:t>30.10.2019</a:t>
+              <a:t>13.05.2020</a:t>
             </a:fld>
-            <a:endParaRPr lang="de-DE"/>
+            <a:endParaRPr lang="de-DE" dirty="0"/>
           </a:p>
         </p:txBody>
       </p:sp>
@@ -1257,7 +1262,7 @@
           <a:bodyPr/>
           <a:lstStyle/>
           <a:p>
-            <a:endParaRPr lang="de-DE"/>
+            <a:endParaRPr lang="de-DE" dirty="0"/>
           </a:p>
         </p:txBody>
       </p:sp>
@@ -1280,7 +1285,7 @@
               <a:rPr lang="de-DE" smtClean="0"/>
               <a:t>‹Nr.›</a:t>
             </a:fld>
-            <a:endParaRPr lang="de-DE"/>
+            <a:endParaRPr lang="de-DE" dirty="0"/>
           </a:p>
         </p:txBody>
       </p:sp>
@@ -1603,9 +1608,9 @@
           <a:p>
             <a:fld id="{7B2E9E56-18CD-4334-9C94-030B6628076E}" type="datetimeFigureOut">
               <a:rPr lang="de-DE" smtClean="0"/>
-              <a:t>30.10.2019</a:t>
+              <a:t>13.05.2020</a:t>
             </a:fld>
-            <a:endParaRPr lang="de-DE"/>
+            <a:endParaRPr lang="de-DE" dirty="0"/>
           </a:p>
         </p:txBody>
       </p:sp>
@@ -1624,7 +1629,7 @@
           <a:bodyPr/>
           <a:lstStyle/>
           <a:p>
-            <a:endParaRPr lang="de-DE"/>
+            <a:endParaRPr lang="de-DE" dirty="0"/>
           </a:p>
         </p:txBody>
       </p:sp>
@@ -1647,7 +1652,7 @@
               <a:rPr lang="de-DE" smtClean="0"/>
               <a:t>‹Nr.›</a:t>
             </a:fld>
-            <a:endParaRPr lang="de-DE"/>
+            <a:endParaRPr lang="de-DE" dirty="0"/>
           </a:p>
         </p:txBody>
       </p:sp>
@@ -1721,9 +1726,9 @@
           <a:p>
             <a:fld id="{7B2E9E56-18CD-4334-9C94-030B6628076E}" type="datetimeFigureOut">
               <a:rPr lang="de-DE" smtClean="0"/>
-              <a:t>30.10.2019</a:t>
+              <a:t>13.05.2020</a:t>
             </a:fld>
-            <a:endParaRPr lang="de-DE"/>
+            <a:endParaRPr lang="de-DE" dirty="0"/>
           </a:p>
         </p:txBody>
       </p:sp>
@@ -1742,7 +1747,7 @@
           <a:bodyPr/>
           <a:lstStyle/>
           <a:p>
-            <a:endParaRPr lang="de-DE"/>
+            <a:endParaRPr lang="de-DE" dirty="0"/>
           </a:p>
         </p:txBody>
       </p:sp>
@@ -1765,7 +1770,7 @@
               <a:rPr lang="de-DE" smtClean="0"/>
               <a:t>‹Nr.›</a:t>
             </a:fld>
-            <a:endParaRPr lang="de-DE"/>
+            <a:endParaRPr lang="de-DE" dirty="0"/>
           </a:p>
         </p:txBody>
       </p:sp>
@@ -1816,9 +1821,9 @@
           <a:p>
             <a:fld id="{7B2E9E56-18CD-4334-9C94-030B6628076E}" type="datetimeFigureOut">
               <a:rPr lang="de-DE" smtClean="0"/>
-              <a:t>30.10.2019</a:t>
+              <a:t>13.05.2020</a:t>
             </a:fld>
-            <a:endParaRPr lang="de-DE"/>
+            <a:endParaRPr lang="de-DE" dirty="0"/>
           </a:p>
         </p:txBody>
       </p:sp>
@@ -1837,7 +1842,7 @@
           <a:bodyPr/>
           <a:lstStyle/>
           <a:p>
-            <a:endParaRPr lang="de-DE"/>
+            <a:endParaRPr lang="de-DE" dirty="0"/>
           </a:p>
         </p:txBody>
       </p:sp>
@@ -1860,7 +1865,7 @@
               <a:rPr lang="de-DE" smtClean="0"/>
               <a:t>‹Nr.›</a:t>
             </a:fld>
-            <a:endParaRPr lang="de-DE"/>
+            <a:endParaRPr lang="de-DE" dirty="0"/>
           </a:p>
         </p:txBody>
       </p:sp>
@@ -2093,9 +2098,9 @@
           <a:p>
             <a:fld id="{7B2E9E56-18CD-4334-9C94-030B6628076E}" type="datetimeFigureOut">
               <a:rPr lang="de-DE" smtClean="0"/>
-              <a:t>30.10.2019</a:t>
+              <a:t>13.05.2020</a:t>
             </a:fld>
-            <a:endParaRPr lang="de-DE"/>
+            <a:endParaRPr lang="de-DE" dirty="0"/>
           </a:p>
         </p:txBody>
       </p:sp>
@@ -2114,7 +2119,7 @@
           <a:bodyPr/>
           <a:lstStyle/>
           <a:p>
-            <a:endParaRPr lang="de-DE"/>
+            <a:endParaRPr lang="de-DE" dirty="0"/>
           </a:p>
         </p:txBody>
       </p:sp>
@@ -2137,7 +2142,7 @@
               <a:rPr lang="de-DE" smtClean="0"/>
               <a:t>‹Nr.›</a:t>
             </a:fld>
-            <a:endParaRPr lang="de-DE"/>
+            <a:endParaRPr lang="de-DE" dirty="0"/>
           </a:p>
         </p:txBody>
       </p:sp>
@@ -2260,7 +2265,7 @@
             </a:lvl9pPr>
           </a:lstStyle>
           <a:p>
-            <a:endParaRPr lang="de-DE"/>
+            <a:endParaRPr lang="de-DE" dirty="0"/>
           </a:p>
         </p:txBody>
       </p:sp>
@@ -2346,9 +2351,9 @@
           <a:p>
             <a:fld id="{7B2E9E56-18CD-4334-9C94-030B6628076E}" type="datetimeFigureOut">
               <a:rPr lang="de-DE" smtClean="0"/>
-              <a:t>30.10.2019</a:t>
+              <a:t>13.05.2020</a:t>
             </a:fld>
-            <a:endParaRPr lang="de-DE"/>
+            <a:endParaRPr lang="de-DE" dirty="0"/>
           </a:p>
         </p:txBody>
       </p:sp>
@@ -2367,7 +2372,7 @@
           <a:bodyPr/>
           <a:lstStyle/>
           <a:p>
-            <a:endParaRPr lang="de-DE"/>
+            <a:endParaRPr lang="de-DE" dirty="0"/>
           </a:p>
         </p:txBody>
       </p:sp>
@@ -2390,7 +2395,7 @@
               <a:rPr lang="de-DE" smtClean="0"/>
               <a:t>‹Nr.›</a:t>
             </a:fld>
-            <a:endParaRPr lang="de-DE"/>
+            <a:endParaRPr lang="de-DE" dirty="0"/>
           </a:p>
         </p:txBody>
       </p:sp>
@@ -2559,9 +2564,9 @@
           <a:p>
             <a:fld id="{7B2E9E56-18CD-4334-9C94-030B6628076E}" type="datetimeFigureOut">
               <a:rPr lang="de-DE" smtClean="0"/>
-              <a:t>30.10.2019</a:t>
+              <a:t>13.05.2020</a:t>
             </a:fld>
-            <a:endParaRPr lang="de-DE"/>
+            <a:endParaRPr lang="de-DE" dirty="0"/>
           </a:p>
         </p:txBody>
       </p:sp>
@@ -2598,7 +2603,7 @@
             </a:lvl1pPr>
           </a:lstStyle>
           <a:p>
-            <a:endParaRPr lang="de-DE"/>
+            <a:endParaRPr lang="de-DE" dirty="0"/>
           </a:p>
         </p:txBody>
       </p:sp>
@@ -2639,7 +2644,7 @@
               <a:rPr lang="de-DE" smtClean="0"/>
               <a:t>‹Nr.›</a:t>
             </a:fld>
-            <a:endParaRPr lang="de-DE"/>
+            <a:endParaRPr lang="de-DE" dirty="0"/>
           </a:p>
         </p:txBody>
       </p:sp>
@@ -3090,7 +3095,7 @@
               <a:pPr algn="ctr">
                 <a:defRPr/>
               </a:pPr>
-              <a:endParaRPr lang="de-DE"/>
+              <a:endParaRPr lang="de-DE" dirty="0"/>
             </a:p>
           </p:txBody>
         </p:sp>
@@ -3598,7 +3603,7 @@
         </p:nvCxnSpPr>
         <p:spPr bwMode="auto">
           <a:xfrm flipH="1">
-            <a:off x="4182056" y="2805410"/>
+            <a:off x="4186562" y="3939236"/>
             <a:ext cx="769655" cy="0"/>
           </a:xfrm>
           <a:prstGeom prst="line">
@@ -3821,7 +3826,7 @@
         </p:nvGrpSpPr>
         <p:grpSpPr>
           <a:xfrm>
-            <a:off x="4342225" y="3968750"/>
+            <a:off x="4330677" y="4419158"/>
             <a:ext cx="432635" cy="649628"/>
             <a:chOff x="7233557" y="1701686"/>
             <a:chExt cx="1453243" cy="4031116"/>
@@ -3863,7 +3868,7 @@
             <a:lstStyle/>
             <a:p>
               <a:pPr algn="ctr"/>
-              <a:endParaRPr lang="de-DE"/>
+              <a:endParaRPr lang="de-DE" dirty="0"/>
             </a:p>
           </p:txBody>
         </p:sp>
@@ -3903,7 +3908,7 @@
             <a:lstStyle/>
             <a:p>
               <a:pPr algn="ctr"/>
-              <a:endParaRPr lang="de-DE"/>
+              <a:endParaRPr lang="de-DE" dirty="0"/>
             </a:p>
           </p:txBody>
         </p:sp>
@@ -3916,7 +3921,7 @@
         </p:nvSpPr>
         <p:spPr>
           <a:xfrm>
-            <a:off x="5519057" y="322197"/>
+            <a:off x="5496906" y="335227"/>
             <a:ext cx="2188028" cy="677108"/>
           </a:xfrm>
           <a:prstGeom prst="rect">
@@ -3931,12 +3936,8 @@
           <a:lstStyle/>
           <a:p>
             <a:r>
-              <a:rPr lang="de-DE" sz="2000" b="1" dirty="0" err="1" smtClean="0"/>
-              <a:t>Grid</a:t>
-            </a:r>
-            <a:r>
               <a:rPr lang="de-DE" sz="2000" b="1" dirty="0" smtClean="0"/>
-              <a:t> Connection</a:t>
+              <a:t>Grid Connection</a:t>
             </a:r>
           </a:p>
           <a:p>
@@ -3945,12 +3946,16 @@
               <a:buChar char="-"/>
             </a:pPr>
             <a:r>
-              <a:rPr lang="de-DE" dirty="0" err="1" smtClean="0"/>
-              <a:t>Pressure</a:t>
-            </a:r>
-            <a:r>
               <a:rPr lang="de-DE" dirty="0" smtClean="0"/>
-              <a:t>: 5 bar</a:t>
+              <a:t>Pressure: </a:t>
+            </a:r>
+            <a:r>
+              <a:rPr lang="de-DE" dirty="0" smtClean="0"/>
+              <a:t>1.1 </a:t>
+            </a:r>
+            <a:r>
+              <a:rPr lang="de-DE" dirty="0" smtClean="0"/>
+              <a:t>bar</a:t>
             </a:r>
           </a:p>
         </p:txBody>
@@ -3964,7 +3969,7 @@
         <p:spPr>
           <a:xfrm>
             <a:off x="5519057" y="1408107"/>
-            <a:ext cx="2365579" cy="1231106"/>
+            <a:ext cx="2365579" cy="400110"/>
           </a:xfrm>
           <a:prstGeom prst="rect">
             <a:avLst/>
@@ -3979,39 +3984,9 @@
           <a:p>
             <a:r>
               <a:rPr lang="de-DE" sz="2000" b="1" dirty="0" smtClean="0"/>
-              <a:t>Pipe:</a:t>
-            </a:r>
-          </a:p>
-          <a:p>
-            <a:pPr marL="285750" indent="-285750">
-              <a:buFontTx/>
-              <a:buChar char="-"/>
-            </a:pPr>
-            <a:r>
-              <a:rPr lang="de-DE" dirty="0" err="1" smtClean="0"/>
-              <a:t>Length</a:t>
-            </a:r>
-            <a:r>
-              <a:rPr lang="de-DE" dirty="0" smtClean="0"/>
-              <a:t>: 100 m</a:t>
-            </a:r>
-          </a:p>
-          <a:p>
-            <a:pPr marL="285750" indent="-285750">
-              <a:buFontTx/>
-              <a:buChar char="-"/>
-            </a:pPr>
-            <a:r>
-              <a:rPr lang="de-DE" dirty="0" smtClean="0"/>
-              <a:t>Diameter: 0.05 m</a:t>
-            </a:r>
-          </a:p>
-          <a:p>
-            <a:pPr marL="285750" indent="-285750">
-              <a:buFontTx/>
-              <a:buChar char="-"/>
-            </a:pPr>
-            <a:endParaRPr lang="de-DE" dirty="0"/>
+              <a:t>Junction 1</a:t>
+            </a:r>
+            <a:endParaRPr lang="de-DE" sz="2000" b="1" dirty="0" smtClean="0"/>
           </a:p>
         </p:txBody>
       </p:sp>
@@ -4023,8 +3998,8 @@
         </p:nvSpPr>
         <p:spPr>
           <a:xfrm>
-            <a:off x="5519056" y="2624560"/>
-            <a:ext cx="2775857" cy="954107"/>
+            <a:off x="8026400" y="1408107"/>
+            <a:ext cx="3385457" cy="923330"/>
           </a:xfrm>
           <a:prstGeom prst="rect">
             <a:avLst/>
@@ -4038,10 +4013,10 @@
           <a:lstStyle/>
           <a:p>
             <a:r>
-              <a:rPr lang="de-DE" sz="2000" b="1" dirty="0" err="1" smtClean="0"/>
-              <a:t>Junction</a:t>
-            </a:r>
-            <a:endParaRPr lang="de-DE" sz="2000" b="1" dirty="0" smtClean="0"/>
+              <a:rPr lang="de-DE" b="1" dirty="0" smtClean="0"/>
+              <a:t>For every Junction</a:t>
+            </a:r>
+            <a:endParaRPr lang="de-DE" b="1" dirty="0" smtClean="0"/>
           </a:p>
           <a:p>
             <a:pPr marL="285750" indent="-285750">
@@ -4049,12 +4024,20 @@
               <a:buChar char="-"/>
             </a:pPr>
             <a:r>
-              <a:rPr lang="de-DE" dirty="0" err="1" smtClean="0"/>
-              <a:t>Pressure</a:t>
-            </a:r>
-            <a:r>
               <a:rPr lang="de-DE" dirty="0" smtClean="0"/>
-              <a:t>: 5 bar</a:t>
+              <a:t>Nominal Pressure</a:t>
+            </a:r>
+            <a:r>
+              <a:rPr lang="de-DE" dirty="0" smtClean="0"/>
+              <a:t>: </a:t>
+            </a:r>
+            <a:r>
+              <a:rPr lang="de-DE" dirty="0" smtClean="0"/>
+              <a:t>1.05 </a:t>
+            </a:r>
+            <a:r>
+              <a:rPr lang="de-DE" dirty="0" smtClean="0"/>
+              <a:t>bar</a:t>
             </a:r>
           </a:p>
           <a:p>
@@ -4064,7 +4047,11 @@
             </a:pPr>
             <a:r>
               <a:rPr lang="de-DE" dirty="0" smtClean="0"/>
-              <a:t>Temperatur: 293.15</a:t>
+              <a:t>Nominal Temperatur</a:t>
+            </a:r>
+            <a:r>
+              <a:rPr lang="de-DE" dirty="0" smtClean="0"/>
+              <a:t>: 293.15 K</a:t>
             </a:r>
             <a:endParaRPr lang="de-DE" dirty="0"/>
           </a:p>
@@ -4078,7 +4065,7 @@
         </p:nvSpPr>
         <p:spPr>
           <a:xfrm>
-            <a:off x="5519057" y="3889726"/>
+            <a:off x="5478235" y="4264853"/>
             <a:ext cx="2367643" cy="954107"/>
           </a:xfrm>
           <a:prstGeom prst="rect">
@@ -4093,13 +4080,10 @@
           <a:lstStyle/>
           <a:p>
             <a:r>
-              <a:rPr lang="de-DE" sz="2000" b="1" dirty="0" err="1" smtClean="0"/>
+              <a:rPr lang="de-DE" sz="2000" b="1" dirty="0" smtClean="0"/>
               <a:t>Valve</a:t>
             </a:r>
-            <a:r>
-              <a:rPr lang="de-DE" sz="2000" b="1" dirty="0" smtClean="0"/>
-              <a:t>-Pipe</a:t>
-            </a:r>
+            <a:endParaRPr lang="de-DE" sz="2000" b="1" dirty="0" smtClean="0"/>
           </a:p>
           <a:p>
             <a:pPr marL="285750" indent="-285750">
@@ -4107,12 +4091,16 @@
               <a:buChar char="-"/>
             </a:pPr>
             <a:r>
-              <a:rPr lang="de-DE" dirty="0" err="1" smtClean="0"/>
-              <a:t>Length</a:t>
-            </a:r>
-            <a:r>
               <a:rPr lang="de-DE" dirty="0" smtClean="0"/>
-              <a:t>: 2000 m</a:t>
+              <a:t>Length: </a:t>
+            </a:r>
+            <a:r>
+              <a:rPr lang="de-DE" dirty="0" smtClean="0"/>
+              <a:t>0 </a:t>
+            </a:r>
+            <a:r>
+              <a:rPr lang="de-DE" dirty="0" smtClean="0"/>
+              <a:t>m</a:t>
             </a:r>
           </a:p>
           <a:p>
@@ -4122,7 +4110,11 @@
             </a:pPr>
             <a:r>
               <a:rPr lang="de-DE" dirty="0" smtClean="0"/>
-              <a:t>Diameter: 0.05 m</a:t>
+              <a:t>Diameter: </a:t>
+            </a:r>
+            <a:r>
+              <a:rPr lang="de-DE" dirty="0" smtClean="0"/>
+              <a:t>50 mm</a:t>
             </a:r>
             <a:endParaRPr lang="de-DE" sz="1600" dirty="0"/>
           </a:p>
@@ -4136,8 +4128,8 @@
         </p:nvSpPr>
         <p:spPr>
           <a:xfrm>
-            <a:off x="5519057" y="5532747"/>
-            <a:ext cx="2445919" cy="677108"/>
+            <a:off x="5519057" y="5944595"/>
+            <a:ext cx="3104243" cy="677108"/>
           </a:xfrm>
           <a:prstGeom prst="rect">
             <a:avLst/>
@@ -4161,21 +4153,166 @@
               <a:buChar char="-"/>
             </a:pPr>
             <a:r>
-              <a:rPr lang="de-DE" dirty="0" err="1" smtClean="0"/>
-              <a:t>Mass</a:t>
-            </a:r>
-            <a:r>
               <a:rPr lang="de-DE" dirty="0" smtClean="0"/>
-              <a:t> </a:t>
-            </a:r>
-            <a:r>
-              <a:rPr lang="de-DE" dirty="0" err="1" smtClean="0"/>
-              <a:t>flow</a:t>
+              <a:t>Mass flow: </a:t>
             </a:r>
             <a:r>
               <a:rPr lang="de-DE" dirty="0" smtClean="0"/>
-              <a:t>: 50 kg/s</a:t>
-            </a:r>
+              <a:t>45 </a:t>
+            </a:r>
+            <a:r>
+              <a:rPr lang="en-GB" dirty="0" smtClean="0"/>
+              <a:t>g/s</a:t>
+            </a:r>
+            <a:endParaRPr lang="en-GB" dirty="0" smtClean="0"/>
+          </a:p>
+        </p:txBody>
+      </p:sp>
+      <p:cxnSp>
+        <p:nvCxnSpPr>
+          <p:cNvPr id="38" name="Gerade Verbindung 135"/>
+          <p:cNvCxnSpPr/>
+          <p:nvPr/>
+        </p:nvCxnSpPr>
+        <p:spPr bwMode="auto">
+          <a:xfrm flipH="1">
+            <a:off x="4180637" y="1675110"/>
+            <a:ext cx="769655" cy="0"/>
+          </a:xfrm>
+          <a:prstGeom prst="line">
+            <a:avLst/>
+          </a:prstGeom>
+          <a:ln w="44450">
+            <a:solidFill>
+              <a:schemeClr val="tx1"/>
+            </a:solidFill>
+          </a:ln>
+        </p:spPr>
+        <p:style>
+          <a:lnRef idx="1">
+            <a:schemeClr val="accent1"/>
+          </a:lnRef>
+          <a:fillRef idx="0">
+            <a:schemeClr val="accent1"/>
+          </a:fillRef>
+          <a:effectRef idx="0">
+            <a:schemeClr val="accent1"/>
+          </a:effectRef>
+          <a:fontRef idx="minor">
+            <a:schemeClr val="tx1"/>
+          </a:fontRef>
+        </p:style>
+      </p:cxnSp>
+      <p:sp>
+        <p:nvSpPr>
+          <p:cNvPr id="2" name="Rechteck 1"/>
+          <p:cNvSpPr/>
+          <p:nvPr/>
+        </p:nvSpPr>
+        <p:spPr>
+          <a:xfrm>
+            <a:off x="5519057" y="2203989"/>
+            <a:ext cx="2286000" cy="954107"/>
+          </a:xfrm>
+          <a:prstGeom prst="rect">
+            <a:avLst/>
+          </a:prstGeom>
+        </p:spPr>
+        <p:txBody>
+          <a:bodyPr wrap="square">
+            <a:spAutoFit/>
+          </a:bodyPr>
+          <a:lstStyle/>
+          <a:p>
+            <a:r>
+              <a:rPr lang="de-DE" sz="2000" b="1" dirty="0"/>
+              <a:t>Pipe</a:t>
+            </a:r>
+          </a:p>
+          <a:p>
+            <a:pPr marL="285750" indent="-285750">
+              <a:buFontTx/>
+              <a:buChar char="-"/>
+            </a:pPr>
+            <a:r>
+              <a:rPr lang="de-DE" dirty="0"/>
+              <a:t>Length: 100 m</a:t>
+            </a:r>
+          </a:p>
+          <a:p>
+            <a:pPr marL="285750" indent="-285750">
+              <a:buFontTx/>
+              <a:buChar char="-"/>
+            </a:pPr>
+            <a:r>
+              <a:rPr lang="de-DE" dirty="0"/>
+              <a:t>Diameter: </a:t>
+            </a:r>
+            <a:r>
+              <a:rPr lang="de-DE" dirty="0" smtClean="0"/>
+              <a:t>50 mm</a:t>
+            </a:r>
+            <a:endParaRPr lang="de-DE" dirty="0"/>
+          </a:p>
+        </p:txBody>
+      </p:sp>
+      <p:sp>
+        <p:nvSpPr>
+          <p:cNvPr id="39" name="Textfeld 38"/>
+          <p:cNvSpPr txBox="1"/>
+          <p:nvPr/>
+        </p:nvSpPr>
+        <p:spPr>
+          <a:xfrm>
+            <a:off x="5519057" y="3676351"/>
+            <a:ext cx="2365579" cy="400110"/>
+          </a:xfrm>
+          <a:prstGeom prst="rect">
+            <a:avLst/>
+          </a:prstGeom>
+          <a:noFill/>
+        </p:spPr>
+        <p:txBody>
+          <a:bodyPr wrap="square" rtlCol="0">
+            <a:spAutoFit/>
+          </a:bodyPr>
+          <a:lstStyle/>
+          <a:p>
+            <a:r>
+              <a:rPr lang="de-DE" sz="2000" b="1" dirty="0" smtClean="0"/>
+              <a:t>Junction 2</a:t>
+            </a:r>
+            <a:endParaRPr lang="de-DE" sz="2000" b="1" dirty="0" smtClean="0"/>
+          </a:p>
+        </p:txBody>
+      </p:sp>
+      <p:sp>
+        <p:nvSpPr>
+          <p:cNvPr id="40" name="Textfeld 39"/>
+          <p:cNvSpPr txBox="1"/>
+          <p:nvPr/>
+        </p:nvSpPr>
+        <p:spPr>
+          <a:xfrm>
+            <a:off x="5519057" y="5381722"/>
+            <a:ext cx="2365579" cy="400110"/>
+          </a:xfrm>
+          <a:prstGeom prst="rect">
+            <a:avLst/>
+          </a:prstGeom>
+          <a:noFill/>
+        </p:spPr>
+        <p:txBody>
+          <a:bodyPr wrap="square" rtlCol="0">
+            <a:spAutoFit/>
+          </a:bodyPr>
+          <a:lstStyle/>
+          <a:p>
+            <a:r>
+              <a:rPr lang="de-DE" sz="2000" b="1" dirty="0" smtClean="0"/>
+              <a:t>Junction 3</a:t>
+            </a:r>
+            <a:endParaRPr lang="de-DE" sz="2000" b="1" dirty="0" smtClean="0"/>
           </a:p>
         </p:txBody>
       </p:sp>

</xml_diff>